<commit_message>
Updating S1 for non-Docker install
</commit_message>
<xml_diff>
--- a/s1/slides/s1.pptx
+++ b/s1/slides/s1.pptx
@@ -5,7 +5,7 @@
     <p:sldMasterId id="2147483648" r:id="rId1"/>
   </p:sldMasterIdLst>
   <p:notesMasterIdLst>
-    <p:notesMasterId r:id="rId14"/>
+    <p:notesMasterId r:id="rId18"/>
   </p:notesMasterIdLst>
   <p:sldIdLst>
     <p:sldId id="256" r:id="rId2"/>
@@ -17,9 +17,13 @@
     <p:sldId id="286" r:id="rId8"/>
     <p:sldId id="293" r:id="rId9"/>
     <p:sldId id="294" r:id="rId10"/>
-    <p:sldId id="295" r:id="rId11"/>
-    <p:sldId id="291" r:id="rId12"/>
-    <p:sldId id="296" r:id="rId13"/>
+    <p:sldId id="300" r:id="rId11"/>
+    <p:sldId id="295" r:id="rId12"/>
+    <p:sldId id="298" r:id="rId13"/>
+    <p:sldId id="291" r:id="rId14"/>
+    <p:sldId id="297" r:id="rId15"/>
+    <p:sldId id="299" r:id="rId16"/>
+    <p:sldId id="296" r:id="rId17"/>
   </p:sldIdLst>
   <p:sldSz cx="12192000" cy="6858000"/>
   <p:notesSz cx="6858000" cy="9144000"/>
@@ -132,8 +136,12 @@
             <p14:sldId id="286"/>
             <p14:sldId id="293"/>
             <p14:sldId id="294"/>
+            <p14:sldId id="300"/>
             <p14:sldId id="295"/>
+            <p14:sldId id="298"/>
             <p14:sldId id="291"/>
+            <p14:sldId id="297"/>
+            <p14:sldId id="299"/>
             <p14:sldId id="296"/>
           </p14:sldIdLst>
         </p14:section>
@@ -228,7 +236,7 @@
           <a:p>
             <a:fld id="{EBD6F028-2067-3740-AA48-A91E93570B1D}" type="datetimeFigureOut">
               <a:rPr lang="en-US" smtClean="0"/>
-              <a:t>9/30/19</a:t>
+              <a:t>9/17/20</a:t>
             </a:fld>
             <a:endParaRPr lang="en-US"/>
           </a:p>
@@ -654,6 +662,582 @@
     <p:extLst>
       <p:ext uri="{BB962C8B-B14F-4D97-AF65-F5344CB8AC3E}">
         <p14:creationId xmlns:p14="http://schemas.microsoft.com/office/powerpoint/2010/main" val="4160022392"/>
+      </p:ext>
+    </p:extLst>
+  </p:cSld>
+  <p:clrMapOvr>
+    <a:masterClrMapping/>
+  </p:clrMapOvr>
+</p:notes>
+</file>
+
+<file path=ppt/notesSlides/notesSlide3.xml><?xml version="1.0" encoding="utf-8"?>
+<p:notes xmlns:a="http://schemas.openxmlformats.org/drawingml/2006/main" xmlns:r="http://schemas.openxmlformats.org/officeDocument/2006/relationships" xmlns:p="http://schemas.openxmlformats.org/presentationml/2006/main">
+  <p:cSld>
+    <p:spTree>
+      <p:nvGrpSpPr>
+        <p:cNvPr id="1" name=""/>
+        <p:cNvGrpSpPr/>
+        <p:nvPr/>
+      </p:nvGrpSpPr>
+      <p:grpSpPr>
+        <a:xfrm>
+          <a:off x="0" y="0"/>
+          <a:ext cx="0" cy="0"/>
+          <a:chOff x="0" y="0"/>
+          <a:chExt cx="0" cy="0"/>
+        </a:xfrm>
+      </p:grpSpPr>
+      <p:sp>
+        <p:nvSpPr>
+          <p:cNvPr id="2" name="Slide Image Placeholder 1"/>
+          <p:cNvSpPr>
+            <a:spLocks noGrp="1" noRot="1" noChangeAspect="1"/>
+          </p:cNvSpPr>
+          <p:nvPr>
+            <p:ph type="sldImg"/>
+          </p:nvPr>
+        </p:nvSpPr>
+        <p:spPr/>
+      </p:sp>
+      <p:sp>
+        <p:nvSpPr>
+          <p:cNvPr id="3" name="Notes Placeholder 2"/>
+          <p:cNvSpPr>
+            <a:spLocks noGrp="1"/>
+          </p:cNvSpPr>
+          <p:nvPr>
+            <p:ph type="body" idx="1"/>
+          </p:nvPr>
+        </p:nvSpPr>
+        <p:spPr/>
+        <p:txBody>
+          <a:bodyPr/>
+          <a:lstStyle/>
+          <a:p>
+            <a:r>
+              <a:rPr lang="en-US" dirty="0"/>
+              <a:t>This year, we won’t be expecting you to install ROS locally on your machines – if this is something you’d like to do, you can, but instead we’ll be providing a server where you can collaborate with project partners to run ROS.</a:t>
+            </a:r>
+          </a:p>
+          <a:p>
+            <a:endParaRPr lang="en-US" dirty="0"/>
+          </a:p>
+          <a:p>
+            <a:r>
+              <a:rPr lang="en-US" dirty="0"/>
+              <a:t>Thus, we only expect you to have a Python 2.7 installation locally and be able to run “basic” scientific computing packages i.e. </a:t>
+            </a:r>
+            <a:r>
+              <a:rPr lang="en-US" dirty="0" err="1"/>
+              <a:t>numpy</a:t>
+            </a:r>
+            <a:r>
+              <a:rPr lang="en-US" dirty="0"/>
+              <a:t>, </a:t>
+            </a:r>
+            <a:r>
+              <a:rPr lang="en-US" dirty="0" err="1"/>
+              <a:t>scipy</a:t>
+            </a:r>
+            <a:r>
+              <a:rPr lang="en-US" dirty="0"/>
+              <a:t>, etc.</a:t>
+            </a:r>
+          </a:p>
+          <a:p>
+            <a:endParaRPr lang="en-US" dirty="0"/>
+          </a:p>
+          <a:p>
+            <a:r>
+              <a:rPr lang="en-US" dirty="0"/>
+              <a:t>However, if you’d like, we do want to point out you have two additional options to running locally:</a:t>
+            </a:r>
+          </a:p>
+          <a:p>
+            <a:pPr marL="171450" indent="-171450">
+              <a:buFontTx/>
+              <a:buChar char="-"/>
+            </a:pPr>
+            <a:r>
+              <a:rPr lang="en-US" dirty="0"/>
+              <a:t>You can set up a dual boot where you partition your hard drive to run a second OS (in this case, Ubuntu 16.04). This allows you to allocate full processing resources when you are running the second OS.</a:t>
+            </a:r>
+          </a:p>
+          <a:p>
+            <a:pPr marL="171450" indent="-171450">
+              <a:buFontTx/>
+              <a:buChar char="-"/>
+            </a:pPr>
+            <a:r>
+              <a:rPr lang="en-US" dirty="0"/>
+              <a:t>Alternatively, you can set up a VM (see the VM guide linked in the section hand out). The one draw back of the VM is that if your laptop isn’t very powerful, you may run into a very slow or </a:t>
+            </a:r>
+            <a:r>
+              <a:rPr lang="en-US" dirty="0" err="1"/>
+              <a:t>laggy</a:t>
+            </a:r>
+            <a:r>
+              <a:rPr lang="en-US" dirty="0"/>
+              <a:t> VM. But this way, you don’t have to partition the hard drive for the class and can delete the VM once you’re done with </a:t>
+            </a:r>
+            <a:r>
+              <a:rPr lang="en-US"/>
+              <a:t>the class.</a:t>
+            </a:r>
+            <a:endParaRPr lang="en-US" dirty="0"/>
+          </a:p>
+        </p:txBody>
+      </p:sp>
+      <p:sp>
+        <p:nvSpPr>
+          <p:cNvPr id="4" name="Slide Number Placeholder 3"/>
+          <p:cNvSpPr>
+            <a:spLocks noGrp="1"/>
+          </p:cNvSpPr>
+          <p:nvPr>
+            <p:ph type="sldNum" sz="quarter" idx="5"/>
+          </p:nvPr>
+        </p:nvSpPr>
+        <p:spPr/>
+        <p:txBody>
+          <a:bodyPr/>
+          <a:lstStyle/>
+          <a:p>
+            <a:fld id="{63B2D7EC-928D-0645-AAE8-498D7443D60E}" type="slidenum">
+              <a:rPr lang="en-US" smtClean="0"/>
+              <a:t>10</a:t>
+            </a:fld>
+            <a:endParaRPr lang="en-US"/>
+          </a:p>
+        </p:txBody>
+      </p:sp>
+    </p:spTree>
+    <p:extLst>
+      <p:ext uri="{BB962C8B-B14F-4D97-AF65-F5344CB8AC3E}">
+        <p14:creationId xmlns:p14="http://schemas.microsoft.com/office/powerpoint/2010/main" val="2795323351"/>
+      </p:ext>
+    </p:extLst>
+  </p:cSld>
+  <p:clrMapOvr>
+    <a:masterClrMapping/>
+  </p:clrMapOvr>
+</p:notes>
+</file>
+
+<file path=ppt/notesSlides/notesSlide4.xml><?xml version="1.0" encoding="utf-8"?>
+<p:notes xmlns:a="http://schemas.openxmlformats.org/drawingml/2006/main" xmlns:r="http://schemas.openxmlformats.org/officeDocument/2006/relationships" xmlns:p="http://schemas.openxmlformats.org/presentationml/2006/main">
+  <p:cSld>
+    <p:spTree>
+      <p:nvGrpSpPr>
+        <p:cNvPr id="1" name=""/>
+        <p:cNvGrpSpPr/>
+        <p:nvPr/>
+      </p:nvGrpSpPr>
+      <p:grpSpPr>
+        <a:xfrm>
+          <a:off x="0" y="0"/>
+          <a:ext cx="0" cy="0"/>
+          <a:chOff x="0" y="0"/>
+          <a:chExt cx="0" cy="0"/>
+        </a:xfrm>
+      </p:grpSpPr>
+      <p:sp>
+        <p:nvSpPr>
+          <p:cNvPr id="2" name="Slide Image Placeholder 1"/>
+          <p:cNvSpPr>
+            <a:spLocks noGrp="1" noRot="1" noChangeAspect="1"/>
+          </p:cNvSpPr>
+          <p:nvPr>
+            <p:ph type="sldImg"/>
+          </p:nvPr>
+        </p:nvSpPr>
+        <p:spPr/>
+      </p:sp>
+      <p:sp>
+        <p:nvSpPr>
+          <p:cNvPr id="3" name="Notes Placeholder 2"/>
+          <p:cNvSpPr>
+            <a:spLocks noGrp="1"/>
+          </p:cNvSpPr>
+          <p:nvPr>
+            <p:ph type="body" idx="1"/>
+          </p:nvPr>
+        </p:nvSpPr>
+        <p:spPr/>
+        <p:txBody>
+          <a:bodyPr/>
+          <a:lstStyle/>
+          <a:p>
+            <a:endParaRPr lang="en-US" dirty="0"/>
+          </a:p>
+        </p:txBody>
+      </p:sp>
+      <p:sp>
+        <p:nvSpPr>
+          <p:cNvPr id="4" name="Slide Number Placeholder 3"/>
+          <p:cNvSpPr>
+            <a:spLocks noGrp="1"/>
+          </p:cNvSpPr>
+          <p:nvPr>
+            <p:ph type="sldNum" sz="quarter" idx="5"/>
+          </p:nvPr>
+        </p:nvSpPr>
+        <p:spPr/>
+        <p:txBody>
+          <a:bodyPr/>
+          <a:lstStyle/>
+          <a:p>
+            <a:fld id="{63B2D7EC-928D-0645-AAE8-498D7443D60E}" type="slidenum">
+              <a:rPr lang="en-US" smtClean="0"/>
+              <a:t>11</a:t>
+            </a:fld>
+            <a:endParaRPr lang="en-US"/>
+          </a:p>
+        </p:txBody>
+      </p:sp>
+    </p:spTree>
+    <p:extLst>
+      <p:ext uri="{BB962C8B-B14F-4D97-AF65-F5344CB8AC3E}">
+        <p14:creationId xmlns:p14="http://schemas.microsoft.com/office/powerpoint/2010/main" val="1930888664"/>
+      </p:ext>
+    </p:extLst>
+  </p:cSld>
+  <p:clrMapOvr>
+    <a:masterClrMapping/>
+  </p:clrMapOvr>
+</p:notes>
+</file>
+
+<file path=ppt/notesSlides/notesSlide5.xml><?xml version="1.0" encoding="utf-8"?>
+<p:notes xmlns:a="http://schemas.openxmlformats.org/drawingml/2006/main" xmlns:r="http://schemas.openxmlformats.org/officeDocument/2006/relationships" xmlns:p="http://schemas.openxmlformats.org/presentationml/2006/main">
+  <p:cSld>
+    <p:spTree>
+      <p:nvGrpSpPr>
+        <p:cNvPr id="1" name=""/>
+        <p:cNvGrpSpPr/>
+        <p:nvPr/>
+      </p:nvGrpSpPr>
+      <p:grpSpPr>
+        <a:xfrm>
+          <a:off x="0" y="0"/>
+          <a:ext cx="0" cy="0"/>
+          <a:chOff x="0" y="0"/>
+          <a:chExt cx="0" cy="0"/>
+        </a:xfrm>
+      </p:grpSpPr>
+      <p:sp>
+        <p:nvSpPr>
+          <p:cNvPr id="2" name="Slide Image Placeholder 1"/>
+          <p:cNvSpPr>
+            <a:spLocks noGrp="1" noRot="1" noChangeAspect="1"/>
+          </p:cNvSpPr>
+          <p:nvPr>
+            <p:ph type="sldImg"/>
+          </p:nvPr>
+        </p:nvSpPr>
+        <p:spPr/>
+      </p:sp>
+      <p:sp>
+        <p:nvSpPr>
+          <p:cNvPr id="3" name="Notes Placeholder 2"/>
+          <p:cNvSpPr>
+            <a:spLocks noGrp="1"/>
+          </p:cNvSpPr>
+          <p:nvPr>
+            <p:ph type="body" idx="1"/>
+          </p:nvPr>
+        </p:nvSpPr>
+        <p:spPr/>
+        <p:txBody>
+          <a:bodyPr/>
+          <a:lstStyle/>
+          <a:p>
+            <a:r>
+              <a:rPr lang="en-US" dirty="0"/>
+              <a:t>While you don’t necessarily need Git if you’re just working on the homework, we do encourage you to use it as a trial process for learning the simple commands e.g. `git commit`, `git push`, etc. </a:t>
+            </a:r>
+          </a:p>
+          <a:p>
+            <a:endParaRPr lang="en-US" dirty="0"/>
+          </a:p>
+          <a:p>
+            <a:r>
+              <a:rPr lang="en-US" dirty="0"/>
+              <a:t>When it comes around to working in your groups of four, you’ll be much more comfortable in handing off code to your partners and all developing code on the same code base at the same time.</a:t>
+            </a:r>
+          </a:p>
+        </p:txBody>
+      </p:sp>
+      <p:sp>
+        <p:nvSpPr>
+          <p:cNvPr id="4" name="Slide Number Placeholder 3"/>
+          <p:cNvSpPr>
+            <a:spLocks noGrp="1"/>
+          </p:cNvSpPr>
+          <p:nvPr>
+            <p:ph type="sldNum" sz="quarter" idx="5"/>
+          </p:nvPr>
+        </p:nvSpPr>
+        <p:spPr/>
+        <p:txBody>
+          <a:bodyPr/>
+          <a:lstStyle/>
+          <a:p>
+            <a:fld id="{63B2D7EC-928D-0645-AAE8-498D7443D60E}" type="slidenum">
+              <a:rPr lang="en-US" smtClean="0"/>
+              <a:t>12</a:t>
+            </a:fld>
+            <a:endParaRPr lang="en-US"/>
+          </a:p>
+        </p:txBody>
+      </p:sp>
+    </p:spTree>
+    <p:extLst>
+      <p:ext uri="{BB962C8B-B14F-4D97-AF65-F5344CB8AC3E}">
+        <p14:creationId xmlns:p14="http://schemas.microsoft.com/office/powerpoint/2010/main" val="3982998395"/>
+      </p:ext>
+    </p:extLst>
+  </p:cSld>
+  <p:clrMapOvr>
+    <a:masterClrMapping/>
+  </p:clrMapOvr>
+</p:notes>
+</file>
+
+<file path=ppt/notesSlides/notesSlide6.xml><?xml version="1.0" encoding="utf-8"?>
+<p:notes xmlns:a="http://schemas.openxmlformats.org/drawingml/2006/main" xmlns:r="http://schemas.openxmlformats.org/officeDocument/2006/relationships" xmlns:p="http://schemas.openxmlformats.org/presentationml/2006/main">
+  <p:cSld>
+    <p:spTree>
+      <p:nvGrpSpPr>
+        <p:cNvPr id="1" name=""/>
+        <p:cNvGrpSpPr/>
+        <p:nvPr/>
+      </p:nvGrpSpPr>
+      <p:grpSpPr>
+        <a:xfrm>
+          <a:off x="0" y="0"/>
+          <a:ext cx="0" cy="0"/>
+          <a:chOff x="0" y="0"/>
+          <a:chExt cx="0" cy="0"/>
+        </a:xfrm>
+      </p:grpSpPr>
+      <p:sp>
+        <p:nvSpPr>
+          <p:cNvPr id="2" name="Slide Image Placeholder 1"/>
+          <p:cNvSpPr>
+            <a:spLocks noGrp="1" noRot="1" noChangeAspect="1"/>
+          </p:cNvSpPr>
+          <p:nvPr>
+            <p:ph type="sldImg"/>
+          </p:nvPr>
+        </p:nvSpPr>
+        <p:spPr/>
+      </p:sp>
+      <p:sp>
+        <p:nvSpPr>
+          <p:cNvPr id="3" name="Notes Placeholder 2"/>
+          <p:cNvSpPr>
+            <a:spLocks noGrp="1"/>
+          </p:cNvSpPr>
+          <p:nvPr>
+            <p:ph type="body" idx="1"/>
+          </p:nvPr>
+        </p:nvSpPr>
+        <p:spPr/>
+        <p:txBody>
+          <a:bodyPr/>
+          <a:lstStyle/>
+          <a:p>
+            <a:r>
+              <a:rPr lang="en-US" dirty="0" err="1"/>
+              <a:t>pdb</a:t>
+            </a:r>
+            <a:r>
+              <a:rPr lang="en-US" dirty="0"/>
+              <a:t> is a useful tool that allows you to place break points in your code. For example, if you have a script with multiple function calls, you can click through and “inspect” the environment.</a:t>
+            </a:r>
+          </a:p>
+          <a:p>
+            <a:endParaRPr lang="en-US" dirty="0"/>
+          </a:p>
+          <a:p>
+            <a:r>
+              <a:rPr lang="en-US" dirty="0"/>
+              <a:t>In the example here, you see that the </a:t>
+            </a:r>
+            <a:r>
+              <a:rPr lang="en-US" i="1" dirty="0" err="1"/>
+              <a:t>initial_integer</a:t>
+            </a:r>
+            <a:r>
+              <a:rPr lang="en-US" i="0" dirty="0"/>
+              <a:t> and </a:t>
+            </a:r>
+            <a:r>
+              <a:rPr lang="en-US" i="1" dirty="0" err="1"/>
+              <a:t>initial_float</a:t>
+            </a:r>
+            <a:r>
+              <a:rPr lang="en-US" i="0" dirty="0"/>
+              <a:t> variables are already instantiated and you can inspect those values and how they’re modified; but at this particular breakpoint, </a:t>
+            </a:r>
+            <a:r>
+              <a:rPr lang="en-US" i="1" dirty="0" err="1"/>
+              <a:t>cast_int_to_float</a:t>
+            </a:r>
+            <a:r>
+              <a:rPr lang="en-US" i="0" dirty="0"/>
+              <a:t> has no values as it hasn’t been assigned a value yet.</a:t>
+            </a:r>
+          </a:p>
+          <a:p>
+            <a:endParaRPr lang="en-US" i="0" dirty="0"/>
+          </a:p>
+          <a:p>
+            <a:r>
+              <a:rPr lang="en-US" b="1" i="0" dirty="0"/>
+              <a:t>Warning</a:t>
+            </a:r>
+            <a:r>
+              <a:rPr lang="en-US" b="0" i="0" dirty="0"/>
+              <a:t>: Make sure to remove any breakpoints or other debugging traces in your code during submission; this will cause the </a:t>
+            </a:r>
+            <a:r>
+              <a:rPr lang="en-US" b="0" i="0" dirty="0" err="1"/>
+              <a:t>autograder</a:t>
+            </a:r>
+            <a:r>
+              <a:rPr lang="en-US" b="0" i="0" dirty="0"/>
+              <a:t> to break!</a:t>
+            </a:r>
+            <a:endParaRPr lang="en-US" b="1" dirty="0"/>
+          </a:p>
+        </p:txBody>
+      </p:sp>
+      <p:sp>
+        <p:nvSpPr>
+          <p:cNvPr id="4" name="Slide Number Placeholder 3"/>
+          <p:cNvSpPr>
+            <a:spLocks noGrp="1"/>
+          </p:cNvSpPr>
+          <p:nvPr>
+            <p:ph type="sldNum" sz="quarter" idx="5"/>
+          </p:nvPr>
+        </p:nvSpPr>
+        <p:spPr/>
+        <p:txBody>
+          <a:bodyPr/>
+          <a:lstStyle/>
+          <a:p>
+            <a:fld id="{63B2D7EC-928D-0645-AAE8-498D7443D60E}" type="slidenum">
+              <a:rPr lang="en-US" smtClean="0"/>
+              <a:t>14</a:t>
+            </a:fld>
+            <a:endParaRPr lang="en-US"/>
+          </a:p>
+        </p:txBody>
+      </p:sp>
+    </p:spTree>
+    <p:extLst>
+      <p:ext uri="{BB962C8B-B14F-4D97-AF65-F5344CB8AC3E}">
+        <p14:creationId xmlns:p14="http://schemas.microsoft.com/office/powerpoint/2010/main" val="902147026"/>
+      </p:ext>
+    </p:extLst>
+  </p:cSld>
+  <p:clrMapOvr>
+    <a:masterClrMapping/>
+  </p:clrMapOvr>
+</p:notes>
+</file>
+
+<file path=ppt/notesSlides/notesSlide7.xml><?xml version="1.0" encoding="utf-8"?>
+<p:notes xmlns:a="http://schemas.openxmlformats.org/drawingml/2006/main" xmlns:r="http://schemas.openxmlformats.org/officeDocument/2006/relationships" xmlns:p="http://schemas.openxmlformats.org/presentationml/2006/main">
+  <p:cSld>
+    <p:spTree>
+      <p:nvGrpSpPr>
+        <p:cNvPr id="1" name=""/>
+        <p:cNvGrpSpPr/>
+        <p:nvPr/>
+      </p:nvGrpSpPr>
+      <p:grpSpPr>
+        <a:xfrm>
+          <a:off x="0" y="0"/>
+          <a:ext cx="0" cy="0"/>
+          <a:chOff x="0" y="0"/>
+          <a:chExt cx="0" cy="0"/>
+        </a:xfrm>
+      </p:grpSpPr>
+      <p:sp>
+        <p:nvSpPr>
+          <p:cNvPr id="2" name="Slide Image Placeholder 1"/>
+          <p:cNvSpPr>
+            <a:spLocks noGrp="1" noRot="1" noChangeAspect="1"/>
+          </p:cNvSpPr>
+          <p:nvPr>
+            <p:ph type="sldImg"/>
+          </p:nvPr>
+        </p:nvSpPr>
+        <p:spPr/>
+      </p:sp>
+      <p:sp>
+        <p:nvSpPr>
+          <p:cNvPr id="3" name="Notes Placeholder 2"/>
+          <p:cNvSpPr>
+            <a:spLocks noGrp="1"/>
+          </p:cNvSpPr>
+          <p:nvPr>
+            <p:ph type="body" idx="1"/>
+          </p:nvPr>
+        </p:nvSpPr>
+        <p:spPr/>
+        <p:txBody>
+          <a:bodyPr/>
+          <a:lstStyle/>
+          <a:p>
+            <a:r>
+              <a:rPr lang="en-US" dirty="0"/>
+              <a:t>In general, we want to emphasize that one of the objectives is to help you learn not only the technical content of how a robot stack comes together, but also the software engineering processes.</a:t>
+            </a:r>
+          </a:p>
+          <a:p>
+            <a:endParaRPr lang="en-US" dirty="0"/>
+          </a:p>
+          <a:p>
+            <a:r>
+              <a:rPr lang="en-US" dirty="0"/>
+              <a:t>As a part of this, we really encourage you to learn how to leverage Google (and specifically Stack Overflow) as a tool for fixing common issues arising in Python and ROS before turning to your peers or the teaching staff.</a:t>
+            </a:r>
+          </a:p>
+        </p:txBody>
+      </p:sp>
+      <p:sp>
+        <p:nvSpPr>
+          <p:cNvPr id="4" name="Slide Number Placeholder 3"/>
+          <p:cNvSpPr>
+            <a:spLocks noGrp="1"/>
+          </p:cNvSpPr>
+          <p:nvPr>
+            <p:ph type="sldNum" sz="quarter" idx="5"/>
+          </p:nvPr>
+        </p:nvSpPr>
+        <p:spPr/>
+        <p:txBody>
+          <a:bodyPr/>
+          <a:lstStyle/>
+          <a:p>
+            <a:fld id="{63B2D7EC-928D-0645-AAE8-498D7443D60E}" type="slidenum">
+              <a:rPr lang="en-US" smtClean="0"/>
+              <a:t>15</a:t>
+            </a:fld>
+            <a:endParaRPr lang="en-US"/>
+          </a:p>
+        </p:txBody>
+      </p:sp>
+    </p:spTree>
+    <p:extLst>
+      <p:ext uri="{BB962C8B-B14F-4D97-AF65-F5344CB8AC3E}">
+        <p14:creationId xmlns:p14="http://schemas.microsoft.com/office/powerpoint/2010/main" val="364494988"/>
       </p:ext>
     </p:extLst>
   </p:cSld>
@@ -1608,7 +2192,7 @@
           <p:cNvPr id="2" name="Title 1">
             <a:extLst>
               <a:ext uri="{FF2B5EF4-FFF2-40B4-BE49-F238E27FC236}">
-                <a16:creationId xmlns:a16="http://schemas.microsoft.com/office/drawing/2014/main" id="{DA118C9C-F9FE-8846-8C75-9DCC8D141079}"/>
+                <a16:creationId xmlns:a16="http://schemas.microsoft.com/office/drawing/2014/main" id="{5CCF6340-E568-E74F-9342-E539FF3B1EA5}"/>
               </a:ext>
             </a:extLst>
           </p:cNvPr>
@@ -1626,7 +2210,7 @@
           <a:p>
             <a:r>
               <a:rPr lang="en-US" dirty="0"/>
-              <a:t>Git</a:t>
+              <a:t>OS Setup</a:t>
             </a:r>
           </a:p>
         </p:txBody>
@@ -1636,7 +2220,7 @@
           <p:cNvPr id="3" name="Content Placeholder 2">
             <a:extLst>
               <a:ext uri="{FF2B5EF4-FFF2-40B4-BE49-F238E27FC236}">
-                <a16:creationId xmlns:a16="http://schemas.microsoft.com/office/drawing/2014/main" id="{1EE933F3-C736-3740-B2AB-007D12A8D2F5}"/>
+                <a16:creationId xmlns:a16="http://schemas.microsoft.com/office/drawing/2014/main" id="{D9C17FC4-FF65-5042-8AED-E1B09C6579CF}"/>
               </a:ext>
             </a:extLst>
           </p:cNvPr>
@@ -1647,87 +2231,72 @@
             <p:ph idx="1"/>
           </p:nvPr>
         </p:nvSpPr>
-        <p:spPr/>
-        <p:txBody>
-          <a:bodyPr>
-            <a:normAutofit/>
-          </a:bodyPr>
-          <a:lstStyle/>
-          <a:p>
-            <a:r>
-              <a:rPr lang="en-US" dirty="0"/>
-              <a:t>Popular source code version control system</a:t>
-            </a:r>
-          </a:p>
-          <a:p>
-            <a:r>
-              <a:rPr lang="en-US" dirty="0"/>
-              <a:t>You probably already use it!</a:t>
-            </a:r>
+        <p:spPr>
+          <a:xfrm>
+            <a:off x="838200" y="1825625"/>
+            <a:ext cx="10515600" cy="4351338"/>
+          </a:xfrm>
+        </p:spPr>
+        <p:txBody>
+          <a:bodyPr/>
+          <a:lstStyle/>
+          <a:p>
+            <a:r>
+              <a:rPr lang="en-US" dirty="0"/>
+              <a:t>Only need a local Python 2.7 installation for the first two </a:t>
+            </a:r>
+            <a:r>
+              <a:rPr lang="en-US" dirty="0" err="1"/>
+              <a:t>homeworks</a:t>
+            </a:r>
+            <a:endParaRPr lang="en-US" dirty="0"/>
           </a:p>
           <a:p>
             <a:pPr lvl="1"/>
             <a:r>
-              <a:rPr lang="en-US" dirty="0" err="1"/>
-              <a:t>Github</a:t>
-            </a:r>
-            <a:r>
-              <a:rPr lang="en-US" dirty="0"/>
-              <a:t>, </a:t>
-            </a:r>
-            <a:r>
-              <a:rPr lang="en-US" dirty="0" err="1"/>
-              <a:t>BitBucket</a:t>
-            </a:r>
-            <a:r>
-              <a:rPr lang="en-US" dirty="0"/>
-              <a:t>, etc. all support Git</a:t>
-            </a:r>
-          </a:p>
-          <a:p>
-            <a:r>
-              <a:rPr lang="en-US" dirty="0"/>
-              <a:t>Replaces the days of</a:t>
+              <a:rPr lang="en-US" dirty="0"/>
+              <a:t>Later, we’ll be providing a server for running ROS remotely and rendering the visualization on your laptop</a:t>
             </a:r>
           </a:p>
           <a:p>
             <a:pPr lvl="1"/>
-            <a:r>
-              <a:rPr lang="en-US" dirty="0" err="1"/>
-              <a:t>Important_doc.docx</a:t>
-            </a:r>
             <a:endParaRPr lang="en-US" dirty="0"/>
           </a:p>
           <a:p>
+            <a:r>
+              <a:rPr lang="en-US" dirty="0"/>
+              <a:t>You have three options:</a:t>
+            </a:r>
+          </a:p>
+          <a:p>
+            <a:pPr marL="914400" lvl="1" indent="-457200">
+              <a:buAutoNum type="arabicPeriod"/>
+            </a:pPr>
+            <a:r>
+              <a:rPr lang="en-US" dirty="0"/>
+              <a:t>Install Python and run your scripts locally on Windows/MacOS/Linux</a:t>
+            </a:r>
+          </a:p>
+          <a:p>
+            <a:pPr marL="914400" lvl="1" indent="-457200">
+              <a:buAutoNum type="arabicPeriod"/>
+            </a:pPr>
+            <a:r>
+              <a:rPr lang="en-US" dirty="0"/>
+              <a:t>Set up a dual boot with Ubuntu 16.04</a:t>
+            </a:r>
+          </a:p>
+          <a:p>
+            <a:pPr marL="914400" lvl="1" indent="-457200">
+              <a:buAutoNum type="arabicPeriod"/>
+            </a:pPr>
+            <a:r>
+              <a:rPr lang="en-US" dirty="0"/>
+              <a:t>Set up a virtual machine with Ubuntu 16.04</a:t>
+            </a:r>
+          </a:p>
+          <a:p>
             <a:pPr lvl="1"/>
-            <a:r>
-              <a:rPr lang="en-US" dirty="0"/>
-              <a:t>Important_doc_v2.docx</a:t>
-            </a:r>
-          </a:p>
-          <a:p>
-            <a:pPr lvl="1"/>
-            <a:r>
-              <a:rPr lang="en-US" dirty="0" err="1"/>
-              <a:t>Important_doc_final.docx</a:t>
-            </a:r>
-            <a:endParaRPr lang="en-US" dirty="0"/>
-          </a:p>
-          <a:p>
-            <a:pPr lvl="1"/>
-            <a:r>
-              <a:rPr lang="en-US" dirty="0"/>
-              <a:t>Important_doc_final2.docx</a:t>
-            </a:r>
-          </a:p>
-          <a:p>
-            <a:pPr lvl="1"/>
-            <a:r>
-              <a:rPr lang="en-US" dirty="0"/>
-              <a:t>Important_doc_final2_USE_THIS_ONE.docx</a:t>
-            </a:r>
-          </a:p>
-          <a:p>
             <a:endParaRPr lang="en-US" dirty="0"/>
           </a:p>
         </p:txBody>
@@ -1737,7 +2306,7 @@
           <p:cNvPr id="4" name="Slide Number Placeholder 3">
             <a:extLst>
               <a:ext uri="{FF2B5EF4-FFF2-40B4-BE49-F238E27FC236}">
-                <a16:creationId xmlns:a16="http://schemas.microsoft.com/office/drawing/2014/main" id="{AA9A09D7-363D-C54F-B82A-F6B8BA865B65}"/>
+                <a16:creationId xmlns:a16="http://schemas.microsoft.com/office/drawing/2014/main" id="{A6220931-62D7-4C48-A777-58A796566BD3}"/>
               </a:ext>
             </a:extLst>
           </p:cNvPr>
@@ -1764,7 +2333,7 @@
     </p:spTree>
     <p:extLst>
       <p:ext uri="{BB962C8B-B14F-4D97-AF65-F5344CB8AC3E}">
-        <p14:creationId xmlns:p14="http://schemas.microsoft.com/office/powerpoint/2010/main" val="1205223148"/>
+        <p14:creationId xmlns:p14="http://schemas.microsoft.com/office/powerpoint/2010/main" val="506665361"/>
       </p:ext>
     </p:extLst>
   </p:cSld>
@@ -1796,7 +2365,7 @@
           <p:cNvPr id="2" name="Title 1">
             <a:extLst>
               <a:ext uri="{FF2B5EF4-FFF2-40B4-BE49-F238E27FC236}">
-                <a16:creationId xmlns:a16="http://schemas.microsoft.com/office/drawing/2014/main" id="{B4A922C3-F90D-C94E-884B-CB79243E66A4}"/>
+                <a16:creationId xmlns:a16="http://schemas.microsoft.com/office/drawing/2014/main" id="{DA118C9C-F9FE-8846-8C75-9DCC8D141079}"/>
               </a:ext>
             </a:extLst>
           </p:cNvPr>
@@ -1814,7 +2383,7 @@
           <a:p>
             <a:r>
               <a:rPr lang="en-US" dirty="0"/>
-              <a:t>Python 2.7</a:t>
+              <a:t>Git</a:t>
             </a:r>
           </a:p>
         </p:txBody>
@@ -1824,7 +2393,7 @@
           <p:cNvPr id="3" name="Content Placeholder 2">
             <a:extLst>
               <a:ext uri="{FF2B5EF4-FFF2-40B4-BE49-F238E27FC236}">
-                <a16:creationId xmlns:a16="http://schemas.microsoft.com/office/drawing/2014/main" id="{93BDEFFB-42E6-B84E-A236-FD9B80709AAA}"/>
+                <a16:creationId xmlns:a16="http://schemas.microsoft.com/office/drawing/2014/main" id="{1EE933F3-C736-3740-B2AB-007D12A8D2F5}"/>
               </a:ext>
             </a:extLst>
           </p:cNvPr>
@@ -1837,34 +2406,82 @@
         </p:nvSpPr>
         <p:spPr/>
         <p:txBody>
-          <a:bodyPr/>
-          <a:lstStyle/>
-          <a:p>
-            <a:r>
-              <a:rPr lang="en-US" dirty="0"/>
-              <a:t>We assume you already have some programming experience at the level of CS 106A</a:t>
-            </a:r>
-          </a:p>
-          <a:p>
-            <a:r>
-              <a:rPr lang="en-US" dirty="0"/>
-              <a:t>As a result, rather than providing a full-blown tutorial about Python, we’ll direct you to last year’s Python + NumPy tutorial (hands-on!)</a:t>
-            </a:r>
-          </a:p>
-          <a:p>
-            <a:r>
-              <a:rPr lang="en-US" dirty="0"/>
-              <a:t>It can be found online at: </a:t>
-            </a:r>
-            <a:r>
-              <a:rPr lang="en-US" dirty="0">
-                <a:hlinkClick r:id="rId2"/>
-              </a:rPr>
-              <a:t>http://asl.stanford.edu/aa274_win1819/pdfs/recitation/Tut3_NumPy.pdf</a:t>
-            </a:r>
-            <a:r>
-              <a:rPr lang="en-US" dirty="0"/>
-              <a:t> </a:t>
+          <a:bodyPr>
+            <a:normAutofit/>
+          </a:bodyPr>
+          <a:lstStyle/>
+          <a:p>
+            <a:r>
+              <a:rPr lang="en-US" dirty="0"/>
+              <a:t>Popular source code version control system</a:t>
+            </a:r>
+          </a:p>
+          <a:p>
+            <a:r>
+              <a:rPr lang="en-US" dirty="0"/>
+              <a:t>You probably already use it!</a:t>
+            </a:r>
+          </a:p>
+          <a:p>
+            <a:pPr lvl="1"/>
+            <a:r>
+              <a:rPr lang="en-US" dirty="0" err="1"/>
+              <a:t>Github</a:t>
+            </a:r>
+            <a:r>
+              <a:rPr lang="en-US" dirty="0"/>
+              <a:t>, </a:t>
+            </a:r>
+            <a:r>
+              <a:rPr lang="en-US" dirty="0" err="1"/>
+              <a:t>BitBucket</a:t>
+            </a:r>
+            <a:r>
+              <a:rPr lang="en-US" dirty="0"/>
+              <a:t>, etc. all support Git</a:t>
+            </a:r>
+          </a:p>
+          <a:p>
+            <a:r>
+              <a:rPr lang="en-US" dirty="0"/>
+              <a:t>Replaces the days of</a:t>
+            </a:r>
+          </a:p>
+          <a:p>
+            <a:pPr lvl="1"/>
+            <a:r>
+              <a:rPr lang="en-US" dirty="0" err="1"/>
+              <a:t>Important_doc.docx</a:t>
+            </a:r>
+            <a:endParaRPr lang="en-US" dirty="0"/>
+          </a:p>
+          <a:p>
+            <a:pPr lvl="1"/>
+            <a:r>
+              <a:rPr lang="en-US" dirty="0"/>
+              <a:t>Important_doc_v2.docx</a:t>
+            </a:r>
+          </a:p>
+          <a:p>
+            <a:pPr lvl="1"/>
+            <a:r>
+              <a:rPr lang="en-US" dirty="0" err="1"/>
+              <a:t>Important_doc_final.docx</a:t>
+            </a:r>
+            <a:endParaRPr lang="en-US" dirty="0"/>
+          </a:p>
+          <a:p>
+            <a:pPr lvl="1"/>
+            <a:r>
+              <a:rPr lang="en-US" dirty="0"/>
+              <a:t>Important_doc_final2.docx</a:t>
+            </a:r>
+          </a:p>
+          <a:p>
+            <a:pPr lvl="1"/>
+            <a:r>
+              <a:rPr lang="en-US" dirty="0"/>
+              <a:t>Important_doc_final2_USE_THIS_ONE.docx</a:t>
             </a:r>
           </a:p>
           <a:p>
@@ -1877,7 +2494,7 @@
           <p:cNvPr id="4" name="Slide Number Placeholder 3">
             <a:extLst>
               <a:ext uri="{FF2B5EF4-FFF2-40B4-BE49-F238E27FC236}">
-                <a16:creationId xmlns:a16="http://schemas.microsoft.com/office/drawing/2014/main" id="{5C43591C-7C98-7B49-BECE-31CC22212330}"/>
+                <a16:creationId xmlns:a16="http://schemas.microsoft.com/office/drawing/2014/main" id="{AA9A09D7-363D-C54F-B82A-F6B8BA865B65}"/>
               </a:ext>
             </a:extLst>
           </p:cNvPr>
@@ -1904,7 +2521,7 @@
     </p:spTree>
     <p:extLst>
       <p:ext uri="{BB962C8B-B14F-4D97-AF65-F5344CB8AC3E}">
-        <p14:creationId xmlns:p14="http://schemas.microsoft.com/office/powerpoint/2010/main" val="387964992"/>
+        <p14:creationId xmlns:p14="http://schemas.microsoft.com/office/powerpoint/2010/main" val="1205223148"/>
       </p:ext>
     </p:extLst>
   </p:cSld>
@@ -1936,6 +2553,578 @@
           <p:cNvPr id="2" name="Title 1">
             <a:extLst>
               <a:ext uri="{FF2B5EF4-FFF2-40B4-BE49-F238E27FC236}">
+                <a16:creationId xmlns:a16="http://schemas.microsoft.com/office/drawing/2014/main" id="{DA118C9C-F9FE-8846-8C75-9DCC8D141079}"/>
+              </a:ext>
+            </a:extLst>
+          </p:cNvPr>
+          <p:cNvSpPr>
+            <a:spLocks noGrp="1"/>
+          </p:cNvSpPr>
+          <p:nvPr>
+            <p:ph type="title"/>
+          </p:nvPr>
+        </p:nvSpPr>
+        <p:spPr/>
+        <p:txBody>
+          <a:bodyPr/>
+          <a:lstStyle/>
+          <a:p>
+            <a:r>
+              <a:rPr lang="en-US" dirty="0"/>
+              <a:t>Git</a:t>
+            </a:r>
+          </a:p>
+        </p:txBody>
+      </p:sp>
+      <p:sp>
+        <p:nvSpPr>
+          <p:cNvPr id="3" name="Content Placeholder 2">
+            <a:extLst>
+              <a:ext uri="{FF2B5EF4-FFF2-40B4-BE49-F238E27FC236}">
+                <a16:creationId xmlns:a16="http://schemas.microsoft.com/office/drawing/2014/main" id="{1EE933F3-C736-3740-B2AB-007D12A8D2F5}"/>
+              </a:ext>
+            </a:extLst>
+          </p:cNvPr>
+          <p:cNvSpPr>
+            <a:spLocks noGrp="1"/>
+          </p:cNvSpPr>
+          <p:nvPr>
+            <p:ph idx="1"/>
+          </p:nvPr>
+        </p:nvSpPr>
+        <p:spPr/>
+        <p:txBody>
+          <a:bodyPr>
+            <a:normAutofit/>
+          </a:bodyPr>
+          <a:lstStyle/>
+          <a:p>
+            <a:r>
+              <a:rPr lang="en-US" dirty="0"/>
+              <a:t>Strongly recommend getting used to using Git on your homework</a:t>
+            </a:r>
+          </a:p>
+          <a:p>
+            <a:pPr lvl="1"/>
+            <a:r>
+              <a:rPr lang="en-US" dirty="0"/>
+              <a:t>If you have a </a:t>
+            </a:r>
+            <a:r>
+              <a:rPr lang="en-US" dirty="0" err="1"/>
+              <a:t>Github</a:t>
+            </a:r>
+            <a:r>
+              <a:rPr lang="en-US" dirty="0"/>
+              <a:t> account, you can fork the homework repo and clone that out</a:t>
+            </a:r>
+          </a:p>
+          <a:p>
+            <a:pPr lvl="1"/>
+            <a:endParaRPr lang="en-US" dirty="0"/>
+          </a:p>
+          <a:p>
+            <a:pPr lvl="1"/>
+            <a:endParaRPr lang="en-US" dirty="0"/>
+          </a:p>
+          <a:p>
+            <a:endParaRPr lang="en-US" dirty="0"/>
+          </a:p>
+        </p:txBody>
+      </p:sp>
+      <p:sp>
+        <p:nvSpPr>
+          <p:cNvPr id="4" name="Slide Number Placeholder 3">
+            <a:extLst>
+              <a:ext uri="{FF2B5EF4-FFF2-40B4-BE49-F238E27FC236}">
+                <a16:creationId xmlns:a16="http://schemas.microsoft.com/office/drawing/2014/main" id="{AA9A09D7-363D-C54F-B82A-F6B8BA865B65}"/>
+              </a:ext>
+            </a:extLst>
+          </p:cNvPr>
+          <p:cNvSpPr>
+            <a:spLocks noGrp="1"/>
+          </p:cNvSpPr>
+          <p:nvPr>
+            <p:ph type="sldNum" sz="quarter" idx="12"/>
+          </p:nvPr>
+        </p:nvSpPr>
+        <p:spPr/>
+        <p:txBody>
+          <a:bodyPr/>
+          <a:lstStyle/>
+          <a:p>
+            <a:fld id="{8AA1F273-EF2F-3941-BBF8-D365CB27DD6A}" type="slidenum">
+              <a:rPr lang="en-US" smtClean="0"/>
+              <a:t>12</a:t>
+            </a:fld>
+            <a:endParaRPr lang="en-US"/>
+          </a:p>
+        </p:txBody>
+      </p:sp>
+    </p:spTree>
+    <p:extLst>
+      <p:ext uri="{BB962C8B-B14F-4D97-AF65-F5344CB8AC3E}">
+        <p14:creationId xmlns:p14="http://schemas.microsoft.com/office/powerpoint/2010/main" val="3538372497"/>
+      </p:ext>
+    </p:extLst>
+  </p:cSld>
+  <p:clrMapOvr>
+    <a:masterClrMapping/>
+  </p:clrMapOvr>
+</p:sld>
+</file>
+
+<file path=ppt/slides/slide13.xml><?xml version="1.0" encoding="utf-8"?>
+<p:sld xmlns:a="http://schemas.openxmlformats.org/drawingml/2006/main" xmlns:r="http://schemas.openxmlformats.org/officeDocument/2006/relationships" xmlns:p="http://schemas.openxmlformats.org/presentationml/2006/main">
+  <p:cSld>
+    <p:spTree>
+      <p:nvGrpSpPr>
+        <p:cNvPr id="1" name=""/>
+        <p:cNvGrpSpPr/>
+        <p:nvPr/>
+      </p:nvGrpSpPr>
+      <p:grpSpPr>
+        <a:xfrm>
+          <a:off x="0" y="0"/>
+          <a:ext cx="0" cy="0"/>
+          <a:chOff x="0" y="0"/>
+          <a:chExt cx="0" cy="0"/>
+        </a:xfrm>
+      </p:grpSpPr>
+      <p:sp>
+        <p:nvSpPr>
+          <p:cNvPr id="2" name="Title 1">
+            <a:extLst>
+              <a:ext uri="{FF2B5EF4-FFF2-40B4-BE49-F238E27FC236}">
+                <a16:creationId xmlns:a16="http://schemas.microsoft.com/office/drawing/2014/main" id="{B4A922C3-F90D-C94E-884B-CB79243E66A4}"/>
+              </a:ext>
+            </a:extLst>
+          </p:cNvPr>
+          <p:cNvSpPr>
+            <a:spLocks noGrp="1"/>
+          </p:cNvSpPr>
+          <p:nvPr>
+            <p:ph type="title"/>
+          </p:nvPr>
+        </p:nvSpPr>
+        <p:spPr/>
+        <p:txBody>
+          <a:bodyPr/>
+          <a:lstStyle/>
+          <a:p>
+            <a:r>
+              <a:rPr lang="en-US" dirty="0"/>
+              <a:t>Python 2.7</a:t>
+            </a:r>
+          </a:p>
+        </p:txBody>
+      </p:sp>
+      <p:sp>
+        <p:nvSpPr>
+          <p:cNvPr id="3" name="Content Placeholder 2">
+            <a:extLst>
+              <a:ext uri="{FF2B5EF4-FFF2-40B4-BE49-F238E27FC236}">
+                <a16:creationId xmlns:a16="http://schemas.microsoft.com/office/drawing/2014/main" id="{93BDEFFB-42E6-B84E-A236-FD9B80709AAA}"/>
+              </a:ext>
+            </a:extLst>
+          </p:cNvPr>
+          <p:cNvSpPr>
+            <a:spLocks noGrp="1"/>
+          </p:cNvSpPr>
+          <p:nvPr>
+            <p:ph idx="1"/>
+          </p:nvPr>
+        </p:nvSpPr>
+        <p:spPr/>
+        <p:txBody>
+          <a:bodyPr/>
+          <a:lstStyle/>
+          <a:p>
+            <a:r>
+              <a:rPr lang="en-US" dirty="0"/>
+              <a:t>We assume you already have some programming experience at the level of CS 106A</a:t>
+            </a:r>
+          </a:p>
+          <a:p>
+            <a:r>
+              <a:rPr lang="en-US" dirty="0"/>
+              <a:t>As a result, rather than providing a full-blown tutorial about Python, we’ll direct you to last year’s Python + NumPy tutorial (hands-on!)</a:t>
+            </a:r>
+          </a:p>
+          <a:p>
+            <a:r>
+              <a:rPr lang="en-US" dirty="0"/>
+              <a:t>It can be found online at: </a:t>
+            </a:r>
+            <a:r>
+              <a:rPr lang="en-US" dirty="0">
+                <a:hlinkClick r:id="rId2"/>
+              </a:rPr>
+              <a:t>http://asl.stanford.edu/aa274_win1819/pdfs/recitation/Tut3_NumPy.pdf</a:t>
+            </a:r>
+            <a:r>
+              <a:rPr lang="en-US" dirty="0"/>
+              <a:t> </a:t>
+            </a:r>
+          </a:p>
+          <a:p>
+            <a:endParaRPr lang="en-US" dirty="0"/>
+          </a:p>
+        </p:txBody>
+      </p:sp>
+      <p:sp>
+        <p:nvSpPr>
+          <p:cNvPr id="4" name="Slide Number Placeholder 3">
+            <a:extLst>
+              <a:ext uri="{FF2B5EF4-FFF2-40B4-BE49-F238E27FC236}">
+                <a16:creationId xmlns:a16="http://schemas.microsoft.com/office/drawing/2014/main" id="{5C43591C-7C98-7B49-BECE-31CC22212330}"/>
+              </a:ext>
+            </a:extLst>
+          </p:cNvPr>
+          <p:cNvSpPr>
+            <a:spLocks noGrp="1"/>
+          </p:cNvSpPr>
+          <p:nvPr>
+            <p:ph type="sldNum" sz="quarter" idx="12"/>
+          </p:nvPr>
+        </p:nvSpPr>
+        <p:spPr/>
+        <p:txBody>
+          <a:bodyPr/>
+          <a:lstStyle/>
+          <a:p>
+            <a:fld id="{8AA1F273-EF2F-3941-BBF8-D365CB27DD6A}" type="slidenum">
+              <a:rPr lang="en-US" smtClean="0"/>
+              <a:t>13</a:t>
+            </a:fld>
+            <a:endParaRPr lang="en-US"/>
+          </a:p>
+        </p:txBody>
+      </p:sp>
+    </p:spTree>
+    <p:extLst>
+      <p:ext uri="{BB962C8B-B14F-4D97-AF65-F5344CB8AC3E}">
+        <p14:creationId xmlns:p14="http://schemas.microsoft.com/office/powerpoint/2010/main" val="387964992"/>
+      </p:ext>
+    </p:extLst>
+  </p:cSld>
+  <p:clrMapOvr>
+    <a:masterClrMapping/>
+  </p:clrMapOvr>
+</p:sld>
+</file>
+
+<file path=ppt/slides/slide14.xml><?xml version="1.0" encoding="utf-8"?>
+<p:sld xmlns:a="http://schemas.openxmlformats.org/drawingml/2006/main" xmlns:r="http://schemas.openxmlformats.org/officeDocument/2006/relationships" xmlns:p="http://schemas.openxmlformats.org/presentationml/2006/main">
+  <p:cSld>
+    <p:spTree>
+      <p:nvGrpSpPr>
+        <p:cNvPr id="1" name=""/>
+        <p:cNvGrpSpPr/>
+        <p:nvPr/>
+      </p:nvGrpSpPr>
+      <p:grpSpPr>
+        <a:xfrm>
+          <a:off x="0" y="0"/>
+          <a:ext cx="0" cy="0"/>
+          <a:chOff x="0" y="0"/>
+          <a:chExt cx="0" cy="0"/>
+        </a:xfrm>
+      </p:grpSpPr>
+      <p:sp>
+        <p:nvSpPr>
+          <p:cNvPr id="2" name="Title 1">
+            <a:extLst>
+              <a:ext uri="{FF2B5EF4-FFF2-40B4-BE49-F238E27FC236}">
+                <a16:creationId xmlns:a16="http://schemas.microsoft.com/office/drawing/2014/main" id="{B4A922C3-F90D-C94E-884B-CB79243E66A4}"/>
+              </a:ext>
+            </a:extLst>
+          </p:cNvPr>
+          <p:cNvSpPr>
+            <a:spLocks noGrp="1"/>
+          </p:cNvSpPr>
+          <p:nvPr>
+            <p:ph type="title"/>
+          </p:nvPr>
+        </p:nvSpPr>
+        <p:spPr/>
+        <p:txBody>
+          <a:bodyPr/>
+          <a:lstStyle/>
+          <a:p>
+            <a:r>
+              <a:rPr lang="en-US" dirty="0"/>
+              <a:t>Debugging</a:t>
+            </a:r>
+          </a:p>
+        </p:txBody>
+      </p:sp>
+      <p:sp>
+        <p:nvSpPr>
+          <p:cNvPr id="3" name="Content Placeholder 2">
+            <a:extLst>
+              <a:ext uri="{FF2B5EF4-FFF2-40B4-BE49-F238E27FC236}">
+                <a16:creationId xmlns:a16="http://schemas.microsoft.com/office/drawing/2014/main" id="{93BDEFFB-42E6-B84E-A236-FD9B80709AAA}"/>
+              </a:ext>
+            </a:extLst>
+          </p:cNvPr>
+          <p:cNvSpPr>
+            <a:spLocks noGrp="1"/>
+          </p:cNvSpPr>
+          <p:nvPr>
+            <p:ph idx="1"/>
+          </p:nvPr>
+        </p:nvSpPr>
+        <p:spPr/>
+        <p:txBody>
+          <a:bodyPr/>
+          <a:lstStyle/>
+          <a:p>
+            <a:r>
+              <a:rPr lang="en-US" dirty="0" err="1"/>
+              <a:t>pdb</a:t>
+            </a:r>
+            <a:endParaRPr lang="en-US" dirty="0"/>
+          </a:p>
+        </p:txBody>
+      </p:sp>
+      <p:sp>
+        <p:nvSpPr>
+          <p:cNvPr id="4" name="Slide Number Placeholder 3">
+            <a:extLst>
+              <a:ext uri="{FF2B5EF4-FFF2-40B4-BE49-F238E27FC236}">
+                <a16:creationId xmlns:a16="http://schemas.microsoft.com/office/drawing/2014/main" id="{5C43591C-7C98-7B49-BECE-31CC22212330}"/>
+              </a:ext>
+            </a:extLst>
+          </p:cNvPr>
+          <p:cNvSpPr>
+            <a:spLocks noGrp="1"/>
+          </p:cNvSpPr>
+          <p:nvPr>
+            <p:ph type="sldNum" sz="quarter" idx="12"/>
+          </p:nvPr>
+        </p:nvSpPr>
+        <p:spPr/>
+        <p:txBody>
+          <a:bodyPr/>
+          <a:lstStyle/>
+          <a:p>
+            <a:fld id="{8AA1F273-EF2F-3941-BBF8-D365CB27DD6A}" type="slidenum">
+              <a:rPr lang="en-US" smtClean="0"/>
+              <a:t>14</a:t>
+            </a:fld>
+            <a:endParaRPr lang="en-US"/>
+          </a:p>
+        </p:txBody>
+      </p:sp>
+      <p:pic>
+        <p:nvPicPr>
+          <p:cNvPr id="6" name="Picture 5">
+            <a:extLst>
+              <a:ext uri="{FF2B5EF4-FFF2-40B4-BE49-F238E27FC236}">
+                <a16:creationId xmlns:a16="http://schemas.microsoft.com/office/drawing/2014/main" id="{A4D4E39E-2B34-8543-B183-A3ACD72EE791}"/>
+              </a:ext>
+            </a:extLst>
+          </p:cNvPr>
+          <p:cNvPicPr>
+            <a:picLocks noChangeAspect="1"/>
+          </p:cNvPicPr>
+          <p:nvPr/>
+        </p:nvPicPr>
+        <p:blipFill>
+          <a:blip r:embed="rId3"/>
+          <a:stretch>
+            <a:fillRect/>
+          </a:stretch>
+        </p:blipFill>
+        <p:spPr>
+          <a:xfrm>
+            <a:off x="3098111" y="1690687"/>
+            <a:ext cx="9151320" cy="4486275"/>
+          </a:xfrm>
+          <a:prstGeom prst="rect">
+            <a:avLst/>
+          </a:prstGeom>
+        </p:spPr>
+      </p:pic>
+    </p:spTree>
+    <p:extLst>
+      <p:ext uri="{BB962C8B-B14F-4D97-AF65-F5344CB8AC3E}">
+        <p14:creationId xmlns:p14="http://schemas.microsoft.com/office/powerpoint/2010/main" val="2585852725"/>
+      </p:ext>
+    </p:extLst>
+  </p:cSld>
+  <p:clrMapOvr>
+    <a:masterClrMapping/>
+  </p:clrMapOvr>
+</p:sld>
+</file>
+
+<file path=ppt/slides/slide15.xml><?xml version="1.0" encoding="utf-8"?>
+<p:sld xmlns:a="http://schemas.openxmlformats.org/drawingml/2006/main" xmlns:r="http://schemas.openxmlformats.org/officeDocument/2006/relationships" xmlns:p="http://schemas.openxmlformats.org/presentationml/2006/main">
+  <p:cSld>
+    <p:spTree>
+      <p:nvGrpSpPr>
+        <p:cNvPr id="1" name=""/>
+        <p:cNvGrpSpPr/>
+        <p:nvPr/>
+      </p:nvGrpSpPr>
+      <p:grpSpPr>
+        <a:xfrm>
+          <a:off x="0" y="0"/>
+          <a:ext cx="0" cy="0"/>
+          <a:chOff x="0" y="0"/>
+          <a:chExt cx="0" cy="0"/>
+        </a:xfrm>
+      </p:grpSpPr>
+      <p:sp>
+        <p:nvSpPr>
+          <p:cNvPr id="2" name="Title 1">
+            <a:extLst>
+              <a:ext uri="{FF2B5EF4-FFF2-40B4-BE49-F238E27FC236}">
+                <a16:creationId xmlns:a16="http://schemas.microsoft.com/office/drawing/2014/main" id="{B4A922C3-F90D-C94E-884B-CB79243E66A4}"/>
+              </a:ext>
+            </a:extLst>
+          </p:cNvPr>
+          <p:cNvSpPr>
+            <a:spLocks noGrp="1"/>
+          </p:cNvSpPr>
+          <p:nvPr>
+            <p:ph type="title"/>
+          </p:nvPr>
+        </p:nvSpPr>
+        <p:spPr/>
+        <p:txBody>
+          <a:bodyPr/>
+          <a:lstStyle/>
+          <a:p>
+            <a:r>
+              <a:rPr lang="en-US" dirty="0"/>
+              <a:t>Debugging</a:t>
+            </a:r>
+          </a:p>
+        </p:txBody>
+      </p:sp>
+      <p:sp>
+        <p:nvSpPr>
+          <p:cNvPr id="3" name="Content Placeholder 2">
+            <a:extLst>
+              <a:ext uri="{FF2B5EF4-FFF2-40B4-BE49-F238E27FC236}">
+                <a16:creationId xmlns:a16="http://schemas.microsoft.com/office/drawing/2014/main" id="{93BDEFFB-42E6-B84E-A236-FD9B80709AAA}"/>
+              </a:ext>
+            </a:extLst>
+          </p:cNvPr>
+          <p:cNvSpPr>
+            <a:spLocks noGrp="1"/>
+          </p:cNvSpPr>
+          <p:nvPr>
+            <p:ph idx="1"/>
+          </p:nvPr>
+        </p:nvSpPr>
+        <p:spPr/>
+        <p:txBody>
+          <a:bodyPr/>
+          <a:lstStyle/>
+          <a:p>
+            <a:r>
+              <a:rPr lang="en-US" dirty="0"/>
+              <a:t>More generally the debugging process is:</a:t>
+            </a:r>
+          </a:p>
+          <a:p>
+            <a:pPr lvl="1"/>
+            <a:r>
+              <a:rPr lang="en-US" dirty="0"/>
+              <a:t>Google it</a:t>
+            </a:r>
+          </a:p>
+          <a:p>
+            <a:pPr lvl="1"/>
+            <a:r>
+              <a:rPr lang="en-US" dirty="0"/>
+              <a:t>Ask a peer in the class</a:t>
+            </a:r>
+          </a:p>
+          <a:p>
+            <a:pPr lvl="1"/>
+            <a:r>
+              <a:rPr lang="en-US" dirty="0"/>
+              <a:t>Google it</a:t>
+            </a:r>
+          </a:p>
+          <a:p>
+            <a:pPr lvl="1"/>
+            <a:r>
+              <a:rPr lang="en-US" dirty="0"/>
+              <a:t>If all else fails, then post on Piazza or at office hours</a:t>
+            </a:r>
+          </a:p>
+        </p:txBody>
+      </p:sp>
+      <p:sp>
+        <p:nvSpPr>
+          <p:cNvPr id="4" name="Slide Number Placeholder 3">
+            <a:extLst>
+              <a:ext uri="{FF2B5EF4-FFF2-40B4-BE49-F238E27FC236}">
+                <a16:creationId xmlns:a16="http://schemas.microsoft.com/office/drawing/2014/main" id="{5C43591C-7C98-7B49-BECE-31CC22212330}"/>
+              </a:ext>
+            </a:extLst>
+          </p:cNvPr>
+          <p:cNvSpPr>
+            <a:spLocks noGrp="1"/>
+          </p:cNvSpPr>
+          <p:nvPr>
+            <p:ph type="sldNum" sz="quarter" idx="12"/>
+          </p:nvPr>
+        </p:nvSpPr>
+        <p:spPr/>
+        <p:txBody>
+          <a:bodyPr/>
+          <a:lstStyle/>
+          <a:p>
+            <a:fld id="{8AA1F273-EF2F-3941-BBF8-D365CB27DD6A}" type="slidenum">
+              <a:rPr lang="en-US" smtClean="0"/>
+              <a:t>15</a:t>
+            </a:fld>
+            <a:endParaRPr lang="en-US"/>
+          </a:p>
+        </p:txBody>
+      </p:sp>
+    </p:spTree>
+    <p:extLst>
+      <p:ext uri="{BB962C8B-B14F-4D97-AF65-F5344CB8AC3E}">
+        <p14:creationId xmlns:p14="http://schemas.microsoft.com/office/powerpoint/2010/main" val="2159901355"/>
+      </p:ext>
+    </p:extLst>
+  </p:cSld>
+  <p:clrMapOvr>
+    <a:masterClrMapping/>
+  </p:clrMapOvr>
+</p:sld>
+</file>
+
+<file path=ppt/slides/slide16.xml><?xml version="1.0" encoding="utf-8"?>
+<p:sld xmlns:a="http://schemas.openxmlformats.org/drawingml/2006/main" xmlns:r="http://schemas.openxmlformats.org/officeDocument/2006/relationships" xmlns:p="http://schemas.openxmlformats.org/presentationml/2006/main">
+  <p:cSld>
+    <p:spTree>
+      <p:nvGrpSpPr>
+        <p:cNvPr id="1" name=""/>
+        <p:cNvGrpSpPr/>
+        <p:nvPr/>
+      </p:nvGrpSpPr>
+      <p:grpSpPr>
+        <a:xfrm>
+          <a:off x="0" y="0"/>
+          <a:ext cx="0" cy="0"/>
+          <a:chOff x="0" y="0"/>
+          <a:chExt cx="0" cy="0"/>
+        </a:xfrm>
+      </p:grpSpPr>
+      <p:sp>
+        <p:nvSpPr>
+          <p:cNvPr id="2" name="Title 1">
+            <a:extLst>
+              <a:ext uri="{FF2B5EF4-FFF2-40B4-BE49-F238E27FC236}">
                 <a16:creationId xmlns:a16="http://schemas.microsoft.com/office/drawing/2014/main" id="{6777F7BA-7EFA-9C42-BE47-E7A74C3DC394}"/>
               </a:ext>
             </a:extLst>
@@ -2021,7 +3210,7 @@
           <a:p>
             <a:fld id="{8AA1F273-EF2F-3941-BBF8-D365CB27DD6A}" type="slidenum">
               <a:rPr lang="en-US" smtClean="0"/>
-              <a:t>12</a:t>
+              <a:t>16</a:t>
             </a:fld>
             <a:endParaRPr lang="en-US"/>
           </a:p>
@@ -2632,31 +3821,6 @@
       </p:sp>
       <p:sp>
         <p:nvSpPr>
-          <p:cNvPr id="3" name="Content Placeholder 2">
-            <a:extLst>
-              <a:ext uri="{FF2B5EF4-FFF2-40B4-BE49-F238E27FC236}">
-                <a16:creationId xmlns:a16="http://schemas.microsoft.com/office/drawing/2014/main" id="{17FEB19C-D1BE-4D4C-AF83-9A03E5E7CAC0}"/>
-              </a:ext>
-            </a:extLst>
-          </p:cNvPr>
-          <p:cNvSpPr>
-            <a:spLocks noGrp="1"/>
-          </p:cNvSpPr>
-          <p:nvPr>
-            <p:ph idx="1"/>
-          </p:nvPr>
-        </p:nvSpPr>
-        <p:spPr/>
-        <p:txBody>
-          <a:bodyPr/>
-          <a:lstStyle/>
-          <a:p>
-            <a:endParaRPr lang="en-US" dirty="0"/>
-          </a:p>
-        </p:txBody>
-      </p:sp>
-      <p:sp>
-        <p:nvSpPr>
           <p:cNvPr id="4" name="Slide Number Placeholder 3">
             <a:extLst>
               <a:ext uri="{FF2B5EF4-FFF2-40B4-BE49-F238E27FC236}">
@@ -2680,6 +3844,31 @@
               <a:rPr lang="en-US" smtClean="0"/>
               <a:t>6</a:t>
             </a:fld>
+            <a:endParaRPr lang="en-US"/>
+          </a:p>
+        </p:txBody>
+      </p:sp>
+      <p:sp>
+        <p:nvSpPr>
+          <p:cNvPr id="8" name="Content Placeholder 7">
+            <a:extLst>
+              <a:ext uri="{FF2B5EF4-FFF2-40B4-BE49-F238E27FC236}">
+                <a16:creationId xmlns:a16="http://schemas.microsoft.com/office/drawing/2014/main" id="{29F43F65-52DA-834E-9469-836451AE377C}"/>
+              </a:ext>
+            </a:extLst>
+          </p:cNvPr>
+          <p:cNvSpPr>
+            <a:spLocks noGrp="1"/>
+          </p:cNvSpPr>
+          <p:nvPr>
+            <p:ph idx="1"/>
+          </p:nvPr>
+        </p:nvSpPr>
+        <p:spPr/>
+        <p:txBody>
+          <a:bodyPr/>
+          <a:lstStyle/>
+          <a:p>
             <a:endParaRPr lang="en-US"/>
           </a:p>
         </p:txBody>
@@ -2755,7 +3944,7 @@
           <a:p>
             <a:r>
               <a:rPr lang="en-US" dirty="0"/>
-              <a:t>Section 1: Introduction to Python2.7, Git, and Installing VMs</a:t>
+              <a:t>Section 1: Introduction to Python2.7, Git, and Debugging</a:t>
             </a:r>
           </a:p>
         </p:txBody>
@@ -2865,19 +4054,6 @@
           <a:p>
             <a:r>
               <a:rPr lang="en-US" dirty="0"/>
-              <a:t>Install Ubuntu virtual machine (VM) locally</a:t>
-            </a:r>
-          </a:p>
-          <a:p>
-            <a:pPr lvl="1"/>
-            <a:r>
-              <a:rPr lang="en-US" dirty="0"/>
-              <a:t>Will be very useful for interfacing with your robots later!</a:t>
-            </a:r>
-          </a:p>
-          <a:p>
-            <a:r>
-              <a:rPr lang="en-US" dirty="0"/>
               <a:t>Learn how to use Git for version control</a:t>
             </a:r>
           </a:p>
@@ -2885,6 +4061,12 @@
             <a:r>
               <a:rPr lang="en-US" dirty="0"/>
               <a:t>Start working with Python 2.7 and some of its most common packages</a:t>
+            </a:r>
+          </a:p>
+          <a:p>
+            <a:r>
+              <a:rPr lang="en-US" dirty="0"/>
+              <a:t>Tips and tricks for debugging</a:t>
             </a:r>
           </a:p>
         </p:txBody>
@@ -2932,7 +4114,7 @@
 </file>
 
 <file path=ppt/slides/slide9.xml><?xml version="1.0" encoding="utf-8"?>
-<p:sld xmlns:a="http://schemas.openxmlformats.org/drawingml/2006/main" xmlns:r="http://schemas.openxmlformats.org/officeDocument/2006/relationships" xmlns:p="http://schemas.openxmlformats.org/presentationml/2006/main">
+<p:sld xmlns:a="http://schemas.openxmlformats.org/drawingml/2006/main" xmlns:r="http://schemas.openxmlformats.org/officeDocument/2006/relationships" xmlns:p="http://schemas.openxmlformats.org/presentationml/2006/main" show="0">
   <p:cSld>
     <p:spTree>
       <p:nvGrpSpPr>

</xml_diff>